<commit_message>
Update the PPT and README.md
</commit_message>
<xml_diff>
--- a/presentation/Deep-Learning-Term-Project.pptx
+++ b/presentation/Deep-Learning-Term-Project.pptx
@@ -5,10 +5,10 @@
     <p:sldMasterId id="2147483648" r:id="rId1"/>
   </p:sldMasterIdLst>
   <p:notesMasterIdLst>
-    <p:notesMasterId r:id="rId21"/>
+    <p:notesMasterId r:id="rId22"/>
   </p:notesMasterIdLst>
   <p:handoutMasterIdLst>
-    <p:handoutMasterId r:id="rId22"/>
+    <p:handoutMasterId r:id="rId23"/>
   </p:handoutMasterIdLst>
   <p:sldIdLst>
     <p:sldId id="256" r:id="rId2"/>
@@ -20,16 +20,17 @@
     <p:sldId id="272" r:id="rId8"/>
     <p:sldId id="273" r:id="rId9"/>
     <p:sldId id="271" r:id="rId10"/>
-    <p:sldId id="274" r:id="rId11"/>
-    <p:sldId id="275" r:id="rId12"/>
-    <p:sldId id="276" r:id="rId13"/>
-    <p:sldId id="277" r:id="rId14"/>
-    <p:sldId id="278" r:id="rId15"/>
-    <p:sldId id="279" r:id="rId16"/>
-    <p:sldId id="280" r:id="rId17"/>
-    <p:sldId id="281" r:id="rId18"/>
-    <p:sldId id="282" r:id="rId19"/>
-    <p:sldId id="267" r:id="rId20"/>
+    <p:sldId id="283" r:id="rId11"/>
+    <p:sldId id="274" r:id="rId12"/>
+    <p:sldId id="275" r:id="rId13"/>
+    <p:sldId id="276" r:id="rId14"/>
+    <p:sldId id="277" r:id="rId15"/>
+    <p:sldId id="278" r:id="rId16"/>
+    <p:sldId id="279" r:id="rId17"/>
+    <p:sldId id="280" r:id="rId18"/>
+    <p:sldId id="281" r:id="rId19"/>
+    <p:sldId id="282" r:id="rId20"/>
+    <p:sldId id="267" r:id="rId21"/>
   </p:sldIdLst>
   <p:sldSz cx="12192000" cy="6858000"/>
   <p:notesSz cx="6858000" cy="9144000"/>
@@ -232,7 +233,7 @@
           <a:p>
             <a:fld id="{762B48F5-BACC-47D6-A0F7-82FBF9C6BC85}" type="datetimeFigureOut">
               <a:rPr lang="en-US"/>
-              <a:t>7/25/2021</a:t>
+              <a:t>7/27/2021</a:t>
             </a:fld>
             <a:endParaRPr/>
           </a:p>
@@ -397,7 +398,7 @@
           <a:p>
             <a:fld id="{0CB1CD00-5424-4675-AB18-2C419B060449}" type="datetimeFigureOut">
               <a:rPr lang="en-US"/>
-              <a:t>7/25/2021</a:t>
+              <a:t>7/27/2021</a:t>
             </a:fld>
             <a:endParaRPr/>
           </a:p>
@@ -1042,7 +1043,7 @@
           <a:p>
             <a:fld id="{37CC0096-1860-4642-9CD2-0079EA5E7CD1}" type="datetimeFigureOut">
               <a:rPr lang="en-US" smtClean="0"/>
-              <a:t>7/25/2021</a:t>
+              <a:t>7/27/2021</a:t>
             </a:fld>
             <a:endParaRPr lang="en-US"/>
           </a:p>
@@ -1221,7 +1222,7 @@
           <a:p>
             <a:fld id="{37CC0096-1860-4642-9CD2-0079EA5E7CD1}" type="datetimeFigureOut">
               <a:rPr lang="en-US" smtClean="0"/>
-              <a:t>7/25/2021</a:t>
+              <a:t>7/27/2021</a:t>
             </a:fld>
             <a:endParaRPr lang="en-US"/>
           </a:p>
@@ -1394,7 +1395,7 @@
           <a:p>
             <a:fld id="{37CC0096-1860-4642-9CD2-0079EA5E7CD1}" type="datetimeFigureOut">
               <a:rPr lang="en-US" smtClean="0"/>
-              <a:t>7/25/2021</a:t>
+              <a:t>7/27/2021</a:t>
             </a:fld>
             <a:endParaRPr lang="en-US"/>
           </a:p>
@@ -1827,7 +1828,7 @@
           <a:p>
             <a:fld id="{37CC0096-1860-4642-9CD2-0079EA5E7CD1}" type="datetimeFigureOut">
               <a:rPr lang="en-US" smtClean="0"/>
-              <a:t>7/25/2021</a:t>
+              <a:t>7/27/2021</a:t>
             </a:fld>
             <a:endParaRPr lang="en-US"/>
           </a:p>
@@ -2266,7 +2267,7 @@
           <a:p>
             <a:fld id="{37CC0096-1860-4642-9CD2-0079EA5E7CD1}" type="datetimeFigureOut">
               <a:rPr lang="en-US" smtClean="0"/>
-              <a:t>7/25/2021</a:t>
+              <a:t>7/27/2021</a:t>
             </a:fld>
             <a:endParaRPr lang="en-US"/>
           </a:p>
@@ -2383,7 +2384,7 @@
           <a:p>
             <a:fld id="{37CC0096-1860-4642-9CD2-0079EA5E7CD1}" type="datetimeFigureOut">
               <a:rPr lang="en-US" smtClean="0"/>
-              <a:t>7/25/2021</a:t>
+              <a:t>7/27/2021</a:t>
             </a:fld>
             <a:endParaRPr lang="en-US"/>
           </a:p>
@@ -2478,7 +2479,7 @@
           <a:p>
             <a:fld id="{37CC0096-1860-4642-9CD2-0079EA5E7CD1}" type="datetimeFigureOut">
               <a:rPr lang="en-US" smtClean="0"/>
-              <a:t>7/25/2021</a:t>
+              <a:t>7/27/2021</a:t>
             </a:fld>
             <a:endParaRPr lang="en-US"/>
           </a:p>
@@ -2762,7 +2763,7 @@
           <a:p>
             <a:fld id="{37CC0096-1860-4642-9CD2-0079EA5E7CD1}" type="datetimeFigureOut">
               <a:rPr lang="en-US" smtClean="0"/>
-              <a:t>7/25/2021</a:t>
+              <a:t>7/27/2021</a:t>
             </a:fld>
             <a:endParaRPr lang="en-US"/>
           </a:p>
@@ -3073,7 +3074,7 @@
           <a:p>
             <a:fld id="{37CC0096-1860-4642-9CD2-0079EA5E7CD1}" type="datetimeFigureOut">
               <a:rPr lang="en-US" smtClean="0"/>
-              <a:t>7/25/2021</a:t>
+              <a:t>7/27/2021</a:t>
             </a:fld>
             <a:endParaRPr lang="en-US"/>
           </a:p>
@@ -3305,7 +3306,7 @@
             <a:fld id="{37CC0096-1860-4642-9CD2-0079EA5E7CD1}" type="datetimeFigureOut">
               <a:rPr lang="en-US" smtClean="0"/>
               <a:pPr/>
-              <a:t>7/25/2021</a:t>
+              <a:t>7/27/2021</a:t>
             </a:fld>
             <a:endParaRPr lang="en-US"/>
           </a:p>
@@ -3819,10 +3820,10 @@
       </p:grpSpPr>
       <p:sp>
         <p:nvSpPr>
-          <p:cNvPr id="5" name="Title 4">
+          <p:cNvPr id="2" name="Title 1">
             <a:extLst>
               <a:ext uri="{FF2B5EF4-FFF2-40B4-BE49-F238E27FC236}">
-                <a16:creationId xmlns:a16="http://schemas.microsoft.com/office/drawing/2014/main" id="{56F3938A-5B5B-4EB1-8204-D5506179AE7A}"/>
+                <a16:creationId xmlns:a16="http://schemas.microsoft.com/office/drawing/2014/main" id="{850CD72F-0D7D-42A6-803A-54E92FDF200F}"/>
               </a:ext>
             </a:extLst>
           </p:cNvPr>
@@ -3840,7 +3841,7 @@
           <a:p>
             <a:r>
               <a:rPr lang="en-US" dirty="0"/>
-              <a:t>Results - Experiments</a:t>
+              <a:t>Data</a:t>
             </a:r>
             <a:endParaRPr lang="en-CA" dirty="0"/>
           </a:p>
@@ -3848,10 +3849,10 @@
       </p:sp>
       <p:sp>
         <p:nvSpPr>
-          <p:cNvPr id="6" name="Content Placeholder 5">
+          <p:cNvPr id="5" name="Content Placeholder 4">
             <a:extLst>
               <a:ext uri="{FF2B5EF4-FFF2-40B4-BE49-F238E27FC236}">
-                <a16:creationId xmlns:a16="http://schemas.microsoft.com/office/drawing/2014/main" id="{D1A4E3FA-68DC-45FD-8569-78456CA407DE}"/>
+                <a16:creationId xmlns:a16="http://schemas.microsoft.com/office/drawing/2014/main" id="{EEF660E0-116A-4AED-AF59-7658FF5A6F34}"/>
               </a:ext>
             </a:extLst>
           </p:cNvPr>
@@ -3864,59 +3865,33 @@
         </p:nvSpPr>
         <p:spPr/>
         <p:txBody>
-          <a:bodyPr>
-            <a:normAutofit/>
-          </a:bodyPr>
+          <a:bodyPr/>
           <a:lstStyle/>
           <a:p>
+            <a:pPr marL="0" indent="0">
+              <a:buNone/>
+            </a:pPr>
             <a:r>
               <a:rPr lang="en-US" dirty="0"/>
-              <a:t>I have experimented with 10K, 20K, and 50K then plotted the Synthetic vs real data in two ways:</a:t>
-            </a:r>
-          </a:p>
-          <a:p>
-            <a:pPr lvl="1"/>
+              <a:t>I have used the data downloaded from Yahoo finance for Google, Apple, and Amazon stock for last 3 to 5 years.</a:t>
+            </a:r>
+          </a:p>
+          <a:p>
+            <a:pPr marL="0" indent="0">
+              <a:buNone/>
+            </a:pPr>
             <a:r>
               <a:rPr lang="en-US" dirty="0"/>
-              <a:t>for each variable I have plotted sample of the data </a:t>
-            </a:r>
-          </a:p>
-          <a:p>
-            <a:pPr lvl="1"/>
-            <a:r>
-              <a:rPr lang="en-US" dirty="0"/>
-              <a:t>Then Reduce the dimension using PCA and TSNE and plot the PCA and TSNE in 2 dimension to compare the data.</a:t>
-            </a:r>
-          </a:p>
-          <a:p>
-            <a:r>
-              <a:rPr lang="en-US" dirty="0"/>
-              <a:t>Finally, two regressor were trained:</a:t>
-            </a:r>
-          </a:p>
-          <a:p>
-            <a:pPr lvl="1"/>
-            <a:r>
-              <a:rPr lang="en-US" dirty="0"/>
-              <a:t>one on real data, predicting the real data</a:t>
-            </a:r>
-          </a:p>
-          <a:p>
-            <a:pPr lvl="1"/>
-            <a:r>
-              <a:rPr lang="en-US" dirty="0"/>
-              <a:t>Another one on synthesized data , predicting the real data</a:t>
-            </a:r>
-          </a:p>
-          <a:p>
-            <a:endParaRPr lang="en-US" dirty="0"/>
+              <a:t>I deliberately used the data in COVID area and before to observe how the behavior is reflected in the synthetic data.</a:t>
+            </a:r>
+            <a:endParaRPr lang="en-CA" dirty="0"/>
           </a:p>
         </p:txBody>
       </p:sp>
     </p:spTree>
     <p:extLst>
       <p:ext uri="{BB962C8B-B14F-4D97-AF65-F5344CB8AC3E}">
-        <p14:creationId xmlns:p14="http://schemas.microsoft.com/office/powerpoint/2010/main" val="4187500504"/>
+        <p14:creationId xmlns:p14="http://schemas.microsoft.com/office/powerpoint/2010/main" val="2839057983"/>
       </p:ext>
     </p:extLst>
   </p:cSld>
@@ -3945,6 +3920,132 @@
       </p:grpSpPr>
       <p:sp>
         <p:nvSpPr>
+          <p:cNvPr id="5" name="Title 4">
+            <a:extLst>
+              <a:ext uri="{FF2B5EF4-FFF2-40B4-BE49-F238E27FC236}">
+                <a16:creationId xmlns:a16="http://schemas.microsoft.com/office/drawing/2014/main" id="{56F3938A-5B5B-4EB1-8204-D5506179AE7A}"/>
+              </a:ext>
+            </a:extLst>
+          </p:cNvPr>
+          <p:cNvSpPr>
+            <a:spLocks noGrp="1"/>
+          </p:cNvSpPr>
+          <p:nvPr>
+            <p:ph type="title"/>
+          </p:nvPr>
+        </p:nvSpPr>
+        <p:spPr/>
+        <p:txBody>
+          <a:bodyPr/>
+          <a:lstStyle/>
+          <a:p>
+            <a:r>
+              <a:rPr lang="en-US" dirty="0"/>
+              <a:t>Results - Experiments</a:t>
+            </a:r>
+            <a:endParaRPr lang="en-CA" dirty="0"/>
+          </a:p>
+        </p:txBody>
+      </p:sp>
+      <p:sp>
+        <p:nvSpPr>
+          <p:cNvPr id="6" name="Content Placeholder 5">
+            <a:extLst>
+              <a:ext uri="{FF2B5EF4-FFF2-40B4-BE49-F238E27FC236}">
+                <a16:creationId xmlns:a16="http://schemas.microsoft.com/office/drawing/2014/main" id="{D1A4E3FA-68DC-45FD-8569-78456CA407DE}"/>
+              </a:ext>
+            </a:extLst>
+          </p:cNvPr>
+          <p:cNvSpPr>
+            <a:spLocks noGrp="1"/>
+          </p:cNvSpPr>
+          <p:nvPr>
+            <p:ph idx="1"/>
+          </p:nvPr>
+        </p:nvSpPr>
+        <p:spPr/>
+        <p:txBody>
+          <a:bodyPr>
+            <a:normAutofit/>
+          </a:bodyPr>
+          <a:lstStyle/>
+          <a:p>
+            <a:r>
+              <a:rPr lang="en-US" dirty="0"/>
+              <a:t>I have experimented with 10K, 20K, and 50K then plotted the Synthetic vs real data in two ways:</a:t>
+            </a:r>
+          </a:p>
+          <a:p>
+            <a:pPr lvl="1"/>
+            <a:r>
+              <a:rPr lang="en-US" dirty="0"/>
+              <a:t>for each variable I have plotted sample of the data </a:t>
+            </a:r>
+          </a:p>
+          <a:p>
+            <a:pPr lvl="1"/>
+            <a:r>
+              <a:rPr lang="en-US" dirty="0"/>
+              <a:t>Then Reduce the dimension using PCA and TSNE and plot the PCA and TSNE in 2 dimension to compare the data.</a:t>
+            </a:r>
+          </a:p>
+          <a:p>
+            <a:r>
+              <a:rPr lang="en-US" dirty="0"/>
+              <a:t>Finally, two regressor were trained:</a:t>
+            </a:r>
+          </a:p>
+          <a:p>
+            <a:pPr lvl="1"/>
+            <a:r>
+              <a:rPr lang="en-US" dirty="0"/>
+              <a:t>one on real data, predicting the real data</a:t>
+            </a:r>
+          </a:p>
+          <a:p>
+            <a:pPr lvl="1"/>
+            <a:r>
+              <a:rPr lang="en-US" dirty="0"/>
+              <a:t>Another one on synthesized data , predicting the real data</a:t>
+            </a:r>
+          </a:p>
+          <a:p>
+            <a:endParaRPr lang="en-US" dirty="0"/>
+          </a:p>
+        </p:txBody>
+      </p:sp>
+    </p:spTree>
+    <p:extLst>
+      <p:ext uri="{BB962C8B-B14F-4D97-AF65-F5344CB8AC3E}">
+        <p14:creationId xmlns:p14="http://schemas.microsoft.com/office/powerpoint/2010/main" val="4187500504"/>
+      </p:ext>
+    </p:extLst>
+  </p:cSld>
+  <p:clrMapOvr>
+    <a:masterClrMapping/>
+  </p:clrMapOvr>
+</p:sld>
+</file>
+
+<file path=ppt/slides/slide12.xml><?xml version="1.0" encoding="utf-8"?>
+<p:sld xmlns:a="http://schemas.openxmlformats.org/drawingml/2006/main" xmlns:r="http://schemas.openxmlformats.org/officeDocument/2006/relationships" xmlns:p="http://schemas.openxmlformats.org/presentationml/2006/main">
+  <p:cSld>
+    <p:spTree>
+      <p:nvGrpSpPr>
+        <p:cNvPr id="1" name=""/>
+        <p:cNvGrpSpPr/>
+        <p:nvPr/>
+      </p:nvGrpSpPr>
+      <p:grpSpPr>
+        <a:xfrm>
+          <a:off x="0" y="0"/>
+          <a:ext cx="0" cy="0"/>
+          <a:chOff x="0" y="0"/>
+          <a:chExt cx="0" cy="0"/>
+        </a:xfrm>
+      </p:grpSpPr>
+      <p:sp>
+        <p:nvSpPr>
           <p:cNvPr id="2" name="Title 1">
             <a:extLst>
               <a:ext uri="{FF2B5EF4-FFF2-40B4-BE49-F238E27FC236}">
@@ -4008,7 +4109,14 @@
             </a:pPr>
             <a:r>
               <a:rPr lang="en-US" sz="4300" dirty="0"/>
-              <a:t>The training is computationally intensive. Especially in the phase III where the generator and embedder are trained twice the discriminator. I am running it on a ThinkPad with 10th Gen i7 CPU and 16GB memory. I do not have NVIDIA GPU. Here are runtime stats:</a:t>
+              <a:t>The training is computationally intensive. Especially in the phase III where the generator and embedder are trained twice the discriminator. </a:t>
+            </a:r>
+            <a:br>
+              <a:rPr lang="en-US" sz="4300" dirty="0"/>
+            </a:br>
+            <a:r>
+              <a:rPr lang="en-US" sz="4300" dirty="0"/>
+              <a:t>I am running it on a ThinkPad with 10th Gen i7 CPU and 16GB memory. I do not have NVIDIA GPU. Here are runtime stats:</a:t>
             </a:r>
           </a:p>
         </p:txBody>
@@ -4029,7 +4137,7 @@
         </p:nvSpPr>
         <p:spPr>
           <a:xfrm>
-            <a:off x="1524000" y="2667000"/>
+            <a:off x="1524000" y="2743200"/>
             <a:ext cx="4038600" cy="3429000"/>
           </a:xfrm>
           <a:prstGeom prst="rect">
@@ -4313,7 +4421,7 @@
         </p:nvSpPr>
         <p:spPr>
           <a:xfrm>
-            <a:off x="6115050" y="2667000"/>
+            <a:off x="6115050" y="2743200"/>
             <a:ext cx="3733800" cy="3429000"/>
           </a:xfrm>
           <a:prstGeom prst="rect">
@@ -4808,7 +4916,7 @@
 </p:sld>
 </file>
 
-<file path=ppt/slides/slide12.xml><?xml version="1.0" encoding="utf-8"?>
+<file path=ppt/slides/slide13.xml><?xml version="1.0" encoding="utf-8"?>
 <p:sld xmlns:a="http://schemas.openxmlformats.org/drawingml/2006/main" xmlns:r="http://schemas.openxmlformats.org/officeDocument/2006/relationships" xmlns:p="http://schemas.openxmlformats.org/presentationml/2006/main">
   <p:cSld>
     <p:spTree>
@@ -4996,7 +5104,7 @@
 </p:sld>
 </file>
 
-<file path=ppt/slides/slide13.xml><?xml version="1.0" encoding="utf-8"?>
+<file path=ppt/slides/slide14.xml><?xml version="1.0" encoding="utf-8"?>
 <p:sld xmlns:a="http://schemas.openxmlformats.org/drawingml/2006/main" xmlns:r="http://schemas.openxmlformats.org/officeDocument/2006/relationships" xmlns:p="http://schemas.openxmlformats.org/presentationml/2006/main">
   <p:cSld>
     <p:spTree>
@@ -5062,7 +5170,7 @@
 </p:sld>
 </file>
 
-<file path=ppt/slides/slide14.xml><?xml version="1.0" encoding="utf-8"?>
+<file path=ppt/slides/slide15.xml><?xml version="1.0" encoding="utf-8"?>
 <p:sld xmlns:a="http://schemas.openxmlformats.org/drawingml/2006/main" xmlns:r="http://schemas.openxmlformats.org/officeDocument/2006/relationships" xmlns:p="http://schemas.openxmlformats.org/presentationml/2006/main">
   <p:cSld>
     <p:spTree>
@@ -5246,7 +5354,7 @@
 </p:sld>
 </file>
 
-<file path=ppt/slides/slide15.xml><?xml version="1.0" encoding="utf-8"?>
+<file path=ppt/slides/slide16.xml><?xml version="1.0" encoding="utf-8"?>
 <p:sld xmlns:a="http://schemas.openxmlformats.org/drawingml/2006/main" xmlns:r="http://schemas.openxmlformats.org/officeDocument/2006/relationships" xmlns:p="http://schemas.openxmlformats.org/presentationml/2006/main">
   <p:cSld>
     <p:spTree>
@@ -5312,7 +5420,7 @@
 </p:sld>
 </file>
 
-<file path=ppt/slides/slide16.xml><?xml version="1.0" encoding="utf-8"?>
+<file path=ppt/slides/slide17.xml><?xml version="1.0" encoding="utf-8"?>
 <p:sld xmlns:a="http://schemas.openxmlformats.org/drawingml/2006/main" xmlns:r="http://schemas.openxmlformats.org/officeDocument/2006/relationships" xmlns:p="http://schemas.openxmlformats.org/presentationml/2006/main">
   <p:cSld>
     <p:spTree>
@@ -5487,7 +5595,7 @@
 </p:sld>
 </file>
 
-<file path=ppt/slides/slide17.xml><?xml version="1.0" encoding="utf-8"?>
+<file path=ppt/slides/slide18.xml><?xml version="1.0" encoding="utf-8"?>
 <p:sld xmlns:a="http://schemas.openxmlformats.org/drawingml/2006/main" xmlns:r="http://schemas.openxmlformats.org/officeDocument/2006/relationships" xmlns:p="http://schemas.openxmlformats.org/presentationml/2006/main">
   <p:cSld>
     <p:spTree>
@@ -5553,111 +5661,6 @@
 </p:sld>
 </file>
 
-<file path=ppt/slides/slide18.xml><?xml version="1.0" encoding="utf-8"?>
-<p:sld xmlns:a="http://schemas.openxmlformats.org/drawingml/2006/main" xmlns:r="http://schemas.openxmlformats.org/officeDocument/2006/relationships" xmlns:p="http://schemas.openxmlformats.org/presentationml/2006/main">
-  <p:cSld>
-    <p:spTree>
-      <p:nvGrpSpPr>
-        <p:cNvPr id="1" name=""/>
-        <p:cNvGrpSpPr/>
-        <p:nvPr/>
-      </p:nvGrpSpPr>
-      <p:grpSpPr>
-        <a:xfrm>
-          <a:off x="0" y="0"/>
-          <a:ext cx="0" cy="0"/>
-          <a:chOff x="0" y="0"/>
-          <a:chExt cx="0" cy="0"/>
-        </a:xfrm>
-      </p:grpSpPr>
-      <p:sp>
-        <p:nvSpPr>
-          <p:cNvPr id="2" name="Title 1">
-            <a:extLst>
-              <a:ext uri="{FF2B5EF4-FFF2-40B4-BE49-F238E27FC236}">
-                <a16:creationId xmlns:a16="http://schemas.microsoft.com/office/drawing/2014/main" id="{A7628E43-2D87-49CA-8347-75FD392F4288}"/>
-              </a:ext>
-            </a:extLst>
-          </p:cNvPr>
-          <p:cNvSpPr>
-            <a:spLocks noGrp="1"/>
-          </p:cNvSpPr>
-          <p:nvPr>
-            <p:ph type="title"/>
-          </p:nvPr>
-        </p:nvSpPr>
-        <p:spPr/>
-        <p:txBody>
-          <a:bodyPr/>
-          <a:lstStyle/>
-          <a:p>
-            <a:r>
-              <a:rPr lang="en-US" dirty="0"/>
-              <a:t>Future experiments</a:t>
-            </a:r>
-            <a:endParaRPr lang="en-CA" dirty="0"/>
-          </a:p>
-        </p:txBody>
-      </p:sp>
-      <p:sp>
-        <p:nvSpPr>
-          <p:cNvPr id="3" name="Content Placeholder 2">
-            <a:extLst>
-              <a:ext uri="{FF2B5EF4-FFF2-40B4-BE49-F238E27FC236}">
-                <a16:creationId xmlns:a16="http://schemas.microsoft.com/office/drawing/2014/main" id="{E5F78976-C0C6-4296-9719-8A4A2D77A95B}"/>
-              </a:ext>
-            </a:extLst>
-          </p:cNvPr>
-          <p:cNvSpPr>
-            <a:spLocks noGrp="1"/>
-          </p:cNvSpPr>
-          <p:nvPr>
-            <p:ph idx="1"/>
-          </p:nvPr>
-        </p:nvSpPr>
-        <p:spPr/>
-        <p:txBody>
-          <a:bodyPr/>
-          <a:lstStyle/>
-          <a:p>
-            <a:r>
-              <a:rPr lang="en-US" dirty="0"/>
-              <a:t>Use LSTM</a:t>
-            </a:r>
-          </a:p>
-          <a:p>
-            <a:r>
-              <a:rPr lang="en-US" dirty="0"/>
-              <a:t>Use more complex network structure</a:t>
-            </a:r>
-          </a:p>
-          <a:p>
-            <a:r>
-              <a:rPr lang="en-US" dirty="0"/>
-              <a:t>Hyperparameter tuning</a:t>
-            </a:r>
-          </a:p>
-          <a:p>
-            <a:r>
-              <a:rPr lang="en-CA" dirty="0"/>
-              <a:t>Sensitivity analysis</a:t>
-            </a:r>
-          </a:p>
-        </p:txBody>
-      </p:sp>
-    </p:spTree>
-    <p:extLst>
-      <p:ext uri="{BB962C8B-B14F-4D97-AF65-F5344CB8AC3E}">
-        <p14:creationId xmlns:p14="http://schemas.microsoft.com/office/powerpoint/2010/main" val="874882617"/>
-      </p:ext>
-    </p:extLst>
-  </p:cSld>
-  <p:clrMapOvr>
-    <a:masterClrMapping/>
-  </p:clrMapOvr>
-</p:sld>
-</file>
-
 <file path=ppt/slides/slide19.xml><?xml version="1.0" encoding="utf-8"?>
 <p:sld xmlns:a="http://schemas.openxmlformats.org/drawingml/2006/main" xmlns:r="http://schemas.openxmlformats.org/officeDocument/2006/relationships" xmlns:p="http://schemas.openxmlformats.org/presentationml/2006/main">
   <p:cSld>
@@ -5680,7 +5683,7 @@
           <p:cNvPr id="2" name="Title 1">
             <a:extLst>
               <a:ext uri="{FF2B5EF4-FFF2-40B4-BE49-F238E27FC236}">
-                <a16:creationId xmlns:a16="http://schemas.microsoft.com/office/drawing/2014/main" id="{2AD7BEBD-6015-4361-9FA4-F81267269A42}"/>
+                <a16:creationId xmlns:a16="http://schemas.microsoft.com/office/drawing/2014/main" id="{A7628E43-2D87-49CA-8347-75FD392F4288}"/>
               </a:ext>
             </a:extLst>
           </p:cNvPr>
@@ -5698,7 +5701,7 @@
           <a:p>
             <a:r>
               <a:rPr lang="en-US" dirty="0"/>
-              <a:t>References</a:t>
+              <a:t>Future experiments</a:t>
             </a:r>
             <a:endParaRPr lang="en-CA" dirty="0"/>
           </a:p>
@@ -5709,7 +5712,7 @@
           <p:cNvPr id="3" name="Content Placeholder 2">
             <a:extLst>
               <a:ext uri="{FF2B5EF4-FFF2-40B4-BE49-F238E27FC236}">
-                <a16:creationId xmlns:a16="http://schemas.microsoft.com/office/drawing/2014/main" id="{89CCA9A7-90FE-4B1C-98D8-108553435529}"/>
+                <a16:creationId xmlns:a16="http://schemas.microsoft.com/office/drawing/2014/main" id="{E5F78976-C0C6-4296-9719-8A4A2D77A95B}"/>
               </a:ext>
             </a:extLst>
           </p:cNvPr>
@@ -5726,46 +5729,34 @@
           <a:lstStyle/>
           <a:p>
             <a:r>
-              <a:rPr lang="en-CA" dirty="0">
-                <a:hlinkClick r:id="rId2"/>
-              </a:rPr>
-              <a:t>https://www.smartinsights.com/internet-marketing-statistics/happens-online-60-seconds/</a:t>
-            </a:r>
-            <a:endParaRPr lang="en-CA" dirty="0"/>
-          </a:p>
-          <a:p>
-            <a:r>
-              <a:rPr lang="en-CA" dirty="0">
-                <a:hlinkClick r:id="rId3"/>
-              </a:rPr>
-              <a:t>https://papers.nips.cc/paper/2014/file/5ca3e9b122f61f8f06494c97b1afccf3-Paper.pdf</a:t>
-            </a:r>
-            <a:endParaRPr lang="en-CA" dirty="0"/>
-          </a:p>
-          <a:p>
-            <a:r>
-              <a:rPr lang="en-CA" dirty="0">
-                <a:hlinkClick r:id="rId4"/>
-              </a:rPr>
-              <a:t>https://papers.nips.cc/paper/2019/file/c9efe5f26cd17ba6216bbe2a7d26d490-Paper.pdf</a:t>
-            </a:r>
-            <a:endParaRPr lang="en-CA" dirty="0"/>
-          </a:p>
-          <a:p>
-            <a:endParaRPr lang="en-CA" dirty="0"/>
-          </a:p>
-          <a:p>
-            <a:endParaRPr lang="en-CA" dirty="0"/>
-          </a:p>
-          <a:p>
-            <a:endParaRPr lang="en-CA" dirty="0"/>
+              <a:rPr lang="en-US" dirty="0"/>
+              <a:t>Use LSTM</a:t>
+            </a:r>
+          </a:p>
+          <a:p>
+            <a:r>
+              <a:rPr lang="en-US" dirty="0"/>
+              <a:t>Use more complex network structure</a:t>
+            </a:r>
+          </a:p>
+          <a:p>
+            <a:r>
+              <a:rPr lang="en-US" dirty="0"/>
+              <a:t>Hyperparameter tuning</a:t>
+            </a:r>
+          </a:p>
+          <a:p>
+            <a:r>
+              <a:rPr lang="en-CA" dirty="0"/>
+              <a:t>Sensitivity analysis</a:t>
+            </a:r>
           </a:p>
         </p:txBody>
       </p:sp>
     </p:spTree>
     <p:extLst>
       <p:ext uri="{BB962C8B-B14F-4D97-AF65-F5344CB8AC3E}">
-        <p14:creationId xmlns:p14="http://schemas.microsoft.com/office/powerpoint/2010/main" val="1120662271"/>
+        <p14:creationId xmlns:p14="http://schemas.microsoft.com/office/powerpoint/2010/main" val="874882617"/>
       </p:ext>
     </p:extLst>
   </p:cSld>
@@ -5868,6 +5859,123 @@
     <p:extLst>
       <p:ext uri="{BB962C8B-B14F-4D97-AF65-F5344CB8AC3E}">
         <p14:creationId xmlns:p14="http://schemas.microsoft.com/office/powerpoint/2010/main" val="3042826300"/>
+      </p:ext>
+    </p:extLst>
+  </p:cSld>
+  <p:clrMapOvr>
+    <a:masterClrMapping/>
+  </p:clrMapOvr>
+</p:sld>
+</file>
+
+<file path=ppt/slides/slide20.xml><?xml version="1.0" encoding="utf-8"?>
+<p:sld xmlns:a="http://schemas.openxmlformats.org/drawingml/2006/main" xmlns:r="http://schemas.openxmlformats.org/officeDocument/2006/relationships" xmlns:p="http://schemas.openxmlformats.org/presentationml/2006/main">
+  <p:cSld>
+    <p:spTree>
+      <p:nvGrpSpPr>
+        <p:cNvPr id="1" name=""/>
+        <p:cNvGrpSpPr/>
+        <p:nvPr/>
+      </p:nvGrpSpPr>
+      <p:grpSpPr>
+        <a:xfrm>
+          <a:off x="0" y="0"/>
+          <a:ext cx="0" cy="0"/>
+          <a:chOff x="0" y="0"/>
+          <a:chExt cx="0" cy="0"/>
+        </a:xfrm>
+      </p:grpSpPr>
+      <p:sp>
+        <p:nvSpPr>
+          <p:cNvPr id="2" name="Title 1">
+            <a:extLst>
+              <a:ext uri="{FF2B5EF4-FFF2-40B4-BE49-F238E27FC236}">
+                <a16:creationId xmlns:a16="http://schemas.microsoft.com/office/drawing/2014/main" id="{2AD7BEBD-6015-4361-9FA4-F81267269A42}"/>
+              </a:ext>
+            </a:extLst>
+          </p:cNvPr>
+          <p:cNvSpPr>
+            <a:spLocks noGrp="1"/>
+          </p:cNvSpPr>
+          <p:nvPr>
+            <p:ph type="title"/>
+          </p:nvPr>
+        </p:nvSpPr>
+        <p:spPr/>
+        <p:txBody>
+          <a:bodyPr/>
+          <a:lstStyle/>
+          <a:p>
+            <a:r>
+              <a:rPr lang="en-US" dirty="0"/>
+              <a:t>References</a:t>
+            </a:r>
+            <a:endParaRPr lang="en-CA" dirty="0"/>
+          </a:p>
+        </p:txBody>
+      </p:sp>
+      <p:sp>
+        <p:nvSpPr>
+          <p:cNvPr id="3" name="Content Placeholder 2">
+            <a:extLst>
+              <a:ext uri="{FF2B5EF4-FFF2-40B4-BE49-F238E27FC236}">
+                <a16:creationId xmlns:a16="http://schemas.microsoft.com/office/drawing/2014/main" id="{89CCA9A7-90FE-4B1C-98D8-108553435529}"/>
+              </a:ext>
+            </a:extLst>
+          </p:cNvPr>
+          <p:cNvSpPr>
+            <a:spLocks noGrp="1"/>
+          </p:cNvSpPr>
+          <p:nvPr>
+            <p:ph idx="1"/>
+          </p:nvPr>
+        </p:nvSpPr>
+        <p:spPr/>
+        <p:txBody>
+          <a:bodyPr/>
+          <a:lstStyle/>
+          <a:p>
+            <a:r>
+              <a:rPr lang="en-CA" dirty="0">
+                <a:hlinkClick r:id="rId2"/>
+              </a:rPr>
+              <a:t>https://www.smartinsights.com/internet-marketing-statistics/happens-online-60-seconds/</a:t>
+            </a:r>
+            <a:endParaRPr lang="en-CA" dirty="0"/>
+          </a:p>
+          <a:p>
+            <a:r>
+              <a:rPr lang="en-CA" dirty="0">
+                <a:hlinkClick r:id="rId3"/>
+              </a:rPr>
+              <a:t>https://papers.nips.cc/paper/2014/file/5ca3e9b122f61f8f06494c97b1afccf3-Paper.pdf</a:t>
+            </a:r>
+            <a:endParaRPr lang="en-CA" dirty="0"/>
+          </a:p>
+          <a:p>
+            <a:r>
+              <a:rPr lang="en-CA" dirty="0">
+                <a:hlinkClick r:id="rId4"/>
+              </a:rPr>
+              <a:t>https://papers.nips.cc/paper/2019/file/c9efe5f26cd17ba6216bbe2a7d26d490-Paper.pdf</a:t>
+            </a:r>
+            <a:endParaRPr lang="en-CA" dirty="0"/>
+          </a:p>
+          <a:p>
+            <a:endParaRPr lang="en-CA" dirty="0"/>
+          </a:p>
+          <a:p>
+            <a:endParaRPr lang="en-CA" dirty="0"/>
+          </a:p>
+          <a:p>
+            <a:endParaRPr lang="en-CA" dirty="0"/>
+          </a:p>
+        </p:txBody>
+      </p:sp>
+    </p:spTree>
+    <p:extLst>
+      <p:ext uri="{BB962C8B-B14F-4D97-AF65-F5344CB8AC3E}">
+        <p14:creationId xmlns:p14="http://schemas.microsoft.com/office/powerpoint/2010/main" val="1120662271"/>
       </p:ext>
     </p:extLst>
   </p:cSld>

</xml_diff>